<commit_message>
Update .gitignore and some data files
</commit_message>
<xml_diff>
--- a/Weather Wizard Presentation.pptx
+++ b/Weather Wizard Presentation.pptx
@@ -4457,13 +4457,337 @@
               </a:spcBef>
             </a:pPr>
             <a:r>
-              <a:rPr lang="en-US" sz="2744">
+              <a:rPr lang="en-US" sz="2744" dirty="0">
                 <a:solidFill>
                   <a:srgbClr val="000000"/>
                 </a:solidFill>
                 <a:latin typeface="DM Sans"/>
               </a:rPr>
-              <a:t>У результаті виконання курсової роботи було спроектовано та реалізовано веб-сервіс прогнозування погоди, що забезпечує користувачів актуальною та достовірною інформацією. </a:t>
+              <a:t>У </a:t>
+            </a:r>
+            <a:r>
+              <a:rPr lang="en-US" sz="2744" dirty="0" err="1">
+                <a:solidFill>
+                  <a:srgbClr val="000000"/>
+                </a:solidFill>
+                <a:latin typeface="DM Sans"/>
+              </a:rPr>
+              <a:t>результаті</a:t>
+            </a:r>
+            <a:r>
+              <a:rPr lang="en-US" sz="2744" dirty="0">
+                <a:solidFill>
+                  <a:srgbClr val="000000"/>
+                </a:solidFill>
+                <a:latin typeface="DM Sans"/>
+              </a:rPr>
+              <a:t> </a:t>
+            </a:r>
+            <a:r>
+              <a:rPr lang="en-US" sz="2744" dirty="0" err="1">
+                <a:solidFill>
+                  <a:srgbClr val="000000"/>
+                </a:solidFill>
+                <a:latin typeface="DM Sans"/>
+              </a:rPr>
+              <a:t>виконання</a:t>
+            </a:r>
+            <a:r>
+              <a:rPr lang="en-US" sz="2744" dirty="0">
+                <a:solidFill>
+                  <a:srgbClr val="000000"/>
+                </a:solidFill>
+                <a:latin typeface="DM Sans"/>
+              </a:rPr>
+              <a:t> </a:t>
+            </a:r>
+            <a:r>
+              <a:rPr lang="en-US" sz="2744" dirty="0" err="1">
+                <a:solidFill>
+                  <a:srgbClr val="000000"/>
+                </a:solidFill>
+                <a:latin typeface="DM Sans"/>
+              </a:rPr>
+              <a:t>курсової</a:t>
+            </a:r>
+            <a:r>
+              <a:rPr lang="en-US" sz="2744" dirty="0">
+                <a:solidFill>
+                  <a:srgbClr val="000000"/>
+                </a:solidFill>
+                <a:latin typeface="DM Sans"/>
+              </a:rPr>
+              <a:t> </a:t>
+            </a:r>
+            <a:r>
+              <a:rPr lang="en-US" sz="2744" dirty="0" err="1">
+                <a:solidFill>
+                  <a:srgbClr val="000000"/>
+                </a:solidFill>
+                <a:latin typeface="DM Sans"/>
+              </a:rPr>
+              <a:t>роботи</a:t>
+            </a:r>
+            <a:r>
+              <a:rPr lang="en-US" sz="2744" dirty="0">
+                <a:solidFill>
+                  <a:srgbClr val="000000"/>
+                </a:solidFill>
+                <a:latin typeface="DM Sans"/>
+              </a:rPr>
+              <a:t> </a:t>
+            </a:r>
+            <a:r>
+              <a:rPr lang="en-US" sz="2744" dirty="0" err="1">
+                <a:solidFill>
+                  <a:srgbClr val="000000"/>
+                </a:solidFill>
+                <a:latin typeface="DM Sans"/>
+              </a:rPr>
+              <a:t>було</a:t>
+            </a:r>
+            <a:r>
+              <a:rPr lang="en-US" sz="2744" dirty="0">
+                <a:solidFill>
+                  <a:srgbClr val="000000"/>
+                </a:solidFill>
+                <a:latin typeface="DM Sans"/>
+              </a:rPr>
+              <a:t> </a:t>
+            </a:r>
+            <a:r>
+              <a:rPr lang="en-US" sz="2744" dirty="0" err="1">
+                <a:solidFill>
+                  <a:srgbClr val="000000"/>
+                </a:solidFill>
+                <a:latin typeface="DM Sans"/>
+              </a:rPr>
+              <a:t>спроектовано</a:t>
+            </a:r>
+            <a:r>
+              <a:rPr lang="en-US" sz="2744" dirty="0">
+                <a:solidFill>
+                  <a:srgbClr val="000000"/>
+                </a:solidFill>
+                <a:latin typeface="DM Sans"/>
+              </a:rPr>
+              <a:t> </a:t>
+            </a:r>
+            <a:r>
+              <a:rPr lang="en-US" sz="2744" dirty="0" err="1">
+                <a:solidFill>
+                  <a:srgbClr val="000000"/>
+                </a:solidFill>
+                <a:latin typeface="DM Sans"/>
+              </a:rPr>
+              <a:t>та</a:t>
+            </a:r>
+            <a:r>
+              <a:rPr lang="en-US" sz="2744" dirty="0">
+                <a:solidFill>
+                  <a:srgbClr val="000000"/>
+                </a:solidFill>
+                <a:latin typeface="DM Sans"/>
+              </a:rPr>
+              <a:t> </a:t>
+            </a:r>
+            <a:r>
+              <a:rPr lang="en-US" sz="2744" dirty="0" err="1">
+                <a:solidFill>
+                  <a:srgbClr val="000000"/>
+                </a:solidFill>
+                <a:latin typeface="DM Sans"/>
+              </a:rPr>
+              <a:t>реалізовано</a:t>
+            </a:r>
+            <a:r>
+              <a:rPr lang="en-US" sz="2744" dirty="0">
+                <a:solidFill>
+                  <a:srgbClr val="000000"/>
+                </a:solidFill>
+                <a:latin typeface="DM Sans"/>
+              </a:rPr>
+              <a:t> </a:t>
+            </a:r>
+            <a:r>
+              <a:rPr lang="en-US" sz="2744" dirty="0" err="1">
+                <a:solidFill>
+                  <a:srgbClr val="000000"/>
+                </a:solidFill>
+                <a:latin typeface="DM Sans"/>
+              </a:rPr>
+              <a:t>веб-сервіс</a:t>
+            </a:r>
+            <a:r>
+              <a:rPr lang="en-US" sz="2744" dirty="0">
+                <a:solidFill>
+                  <a:srgbClr val="000000"/>
+                </a:solidFill>
+                <a:latin typeface="DM Sans"/>
+              </a:rPr>
+              <a:t> </a:t>
+            </a:r>
+            <a:r>
+              <a:rPr lang="en-US" sz="2744" dirty="0" err="1">
+                <a:solidFill>
+                  <a:srgbClr val="000000"/>
+                </a:solidFill>
+                <a:latin typeface="DM Sans"/>
+              </a:rPr>
+              <a:t>прогнозування</a:t>
+            </a:r>
+            <a:r>
+              <a:rPr lang="en-US" sz="2744" dirty="0">
+                <a:solidFill>
+                  <a:srgbClr val="000000"/>
+                </a:solidFill>
+                <a:latin typeface="DM Sans"/>
+              </a:rPr>
+              <a:t> </a:t>
+            </a:r>
+            <a:r>
+              <a:rPr lang="en-US" sz="2744" dirty="0" err="1">
+                <a:solidFill>
+                  <a:srgbClr val="000000"/>
+                </a:solidFill>
+                <a:latin typeface="DM Sans"/>
+              </a:rPr>
+              <a:t>погоди</a:t>
+            </a:r>
+            <a:r>
+              <a:rPr lang="en-US" sz="2744" dirty="0">
+                <a:solidFill>
+                  <a:srgbClr val="000000"/>
+                </a:solidFill>
+                <a:latin typeface="DM Sans"/>
+              </a:rPr>
+              <a:t>, </a:t>
+            </a:r>
+            <a:r>
+              <a:rPr lang="en-US" sz="2744" dirty="0" err="1">
+                <a:solidFill>
+                  <a:srgbClr val="000000"/>
+                </a:solidFill>
+                <a:latin typeface="DM Sans"/>
+              </a:rPr>
+              <a:t>що</a:t>
+            </a:r>
+            <a:r>
+              <a:rPr lang="en-US" sz="2744" dirty="0">
+                <a:solidFill>
+                  <a:srgbClr val="000000"/>
+                </a:solidFill>
+                <a:latin typeface="DM Sans"/>
+              </a:rPr>
+              <a:t> </a:t>
+            </a:r>
+            <a:r>
+              <a:rPr lang="en-US" sz="2744" dirty="0" err="1">
+                <a:solidFill>
+                  <a:srgbClr val="000000"/>
+                </a:solidFill>
+                <a:latin typeface="DM Sans"/>
+              </a:rPr>
+              <a:t>забезпечує</a:t>
+            </a:r>
+            <a:r>
+              <a:rPr lang="en-US" sz="2744" dirty="0">
+                <a:solidFill>
+                  <a:srgbClr val="000000"/>
+                </a:solidFill>
+                <a:latin typeface="DM Sans"/>
+              </a:rPr>
+              <a:t> </a:t>
+            </a:r>
+            <a:r>
+              <a:rPr lang="en-US" sz="2744" dirty="0" err="1">
+                <a:solidFill>
+                  <a:srgbClr val="000000"/>
+                </a:solidFill>
+                <a:latin typeface="DM Sans"/>
+              </a:rPr>
+              <a:t>користувачів</a:t>
+            </a:r>
+            <a:r>
+              <a:rPr lang="en-US" sz="2744" dirty="0">
+                <a:solidFill>
+                  <a:srgbClr val="000000"/>
+                </a:solidFill>
+                <a:latin typeface="DM Sans"/>
+              </a:rPr>
+              <a:t> </a:t>
+            </a:r>
+            <a:r>
+              <a:rPr lang="en-US" sz="2744" dirty="0" err="1">
+                <a:solidFill>
+                  <a:srgbClr val="000000"/>
+                </a:solidFill>
+                <a:latin typeface="DM Sans"/>
+              </a:rPr>
+              <a:t>актуальною</a:t>
+            </a:r>
+            <a:r>
+              <a:rPr lang="en-US" sz="2744" dirty="0">
+                <a:solidFill>
+                  <a:srgbClr val="000000"/>
+                </a:solidFill>
+                <a:latin typeface="DM Sans"/>
+              </a:rPr>
+              <a:t> </a:t>
+            </a:r>
+            <a:r>
+              <a:rPr lang="en-US" sz="2744" dirty="0" err="1">
+                <a:solidFill>
+                  <a:srgbClr val="000000"/>
+                </a:solidFill>
+                <a:latin typeface="DM Sans"/>
+              </a:rPr>
+              <a:t>та</a:t>
+            </a:r>
+            <a:r>
+              <a:rPr lang="en-US" sz="2744" dirty="0">
+                <a:solidFill>
+                  <a:srgbClr val="000000"/>
+                </a:solidFill>
+                <a:latin typeface="DM Sans"/>
+              </a:rPr>
+              <a:t> </a:t>
+            </a:r>
+            <a:r>
+              <a:rPr lang="en-US" sz="2744" dirty="0" err="1">
+                <a:solidFill>
+                  <a:srgbClr val="000000"/>
+                </a:solidFill>
+                <a:latin typeface="DM Sans"/>
+              </a:rPr>
+              <a:t>достовірною</a:t>
+            </a:r>
+            <a:r>
+              <a:rPr lang="en-US" sz="2744" dirty="0">
+                <a:solidFill>
+                  <a:srgbClr val="000000"/>
+                </a:solidFill>
+                <a:latin typeface="DM Sans"/>
+              </a:rPr>
+              <a:t> </a:t>
+            </a:r>
+            <a:r>
+              <a:rPr lang="en-US" sz="2744" dirty="0" err="1">
+                <a:solidFill>
+                  <a:srgbClr val="000000"/>
+                </a:solidFill>
+                <a:latin typeface="DM Sans"/>
+              </a:rPr>
+              <a:t>інформацією</a:t>
+            </a:r>
+            <a:r>
+              <a:rPr lang="en-US" sz="2744" dirty="0">
+                <a:solidFill>
+                  <a:srgbClr val="000000"/>
+                </a:solidFill>
+                <a:latin typeface="DM Sans"/>
+              </a:rPr>
+              <a:t>. </a:t>
             </a:r>
           </a:p>
         </p:txBody>
@@ -5084,10 +5408,10 @@
         </p:nvGrpSpPr>
         <p:grpSpPr>
           <a:xfrm>
-            <a:off x="11795481" y="3099453"/>
-            <a:ext cx="3474003" cy="647719"/>
-            <a:chOff x="0" y="0"/>
-            <a:chExt cx="914964" cy="170593"/>
+            <a:off x="12127551" y="2954809"/>
+            <a:ext cx="3485246" cy="864710"/>
+            <a:chOff x="0" y="-32562"/>
+            <a:chExt cx="917925" cy="227743"/>
           </a:xfrm>
         </p:grpSpPr>
         <p:sp>
@@ -5138,7 +5462,7 @@
           </p:nvSpPr>
           <p:spPr>
             <a:xfrm>
-              <a:off x="0" y="-57150"/>
+              <a:off x="2961" y="-32562"/>
               <a:ext cx="914964" cy="227743"/>
             </a:xfrm>
             <a:prstGeom prst="rect">
@@ -5158,7 +5482,7 @@
                 </a:spcBef>
               </a:pPr>
               <a:r>
-                <a:rPr lang="en-US" sz="2981" spc="29">
+                <a:rPr lang="en-US" sz="2981" spc="29" dirty="0" err="1">
                   <a:solidFill>
                     <a:srgbClr val="FFFFFF"/>
                   </a:solidFill>
@@ -5166,6 +5490,12 @@
                 </a:rPr>
                 <a:t>Призначення</a:t>
               </a:r>
+              <a:endParaRPr lang="en-US" sz="2981" spc="29" dirty="0">
+                <a:solidFill>
+                  <a:srgbClr val="FFFFFF"/>
+                </a:solidFill>
+                <a:latin typeface="DM Sans Bold"/>
+              </a:endParaRPr>
             </a:p>
           </p:txBody>
         </p:sp>
@@ -5369,15 +5699,15 @@
         </p:nvSpPr>
         <p:spPr>
           <a:xfrm>
-            <a:off x="11171889" y="3903475"/>
-            <a:ext cx="4896730" cy="1057662"/>
+            <a:off x="10896600" y="3903475"/>
+            <a:ext cx="5867399" cy="1057662"/>
           </a:xfrm>
           <a:prstGeom prst="rect">
             <a:avLst/>
           </a:prstGeom>
         </p:spPr>
         <p:txBody>
-          <a:bodyPr lIns="0" tIns="0" rIns="0" bIns="0" rtlCol="0" anchor="t">
+          <a:bodyPr wrap="square" lIns="0" tIns="0" rIns="0" bIns="0" rtlCol="0" anchor="t">
             <a:spAutoFit/>
           </a:bodyPr>
           <a:lstStyle/>
@@ -5397,7 +5727,7 @@
                 </a:solidFill>
                 <a:latin typeface="DM Sans"/>
               </a:rPr>
-              <a:t>Отримання точних даних для прийняття рішень у бізнесі або повсякденному житті</a:t>
+              <a:t>Отримання точних даних для побудови власних застосунків або використання у повсякденному житті</a:t>
             </a:r>
           </a:p>
         </p:txBody>
@@ -5435,7 +5765,7 @@
         </p:nvSpPr>
         <p:spPr>
           <a:xfrm flipH="1" flipV="1">
-            <a:off x="37475" y="0"/>
+            <a:off x="114648" y="-52106"/>
             <a:ext cx="18288000" cy="10287000"/>
           </a:xfrm>
           <a:custGeom>
@@ -5533,8 +5863,8 @@
         </p:nvGrpSpPr>
         <p:grpSpPr>
           <a:xfrm>
-            <a:off x="3188524" y="4213833"/>
-            <a:ext cx="4003984" cy="2148731"/>
+            <a:off x="3328896" y="3826335"/>
+            <a:ext cx="4003984" cy="2428152"/>
             <a:chOff x="0" y="0"/>
             <a:chExt cx="1468587" cy="788115"/>
           </a:xfrm>
@@ -5661,7 +5991,7 @@
         </p:nvGrpSpPr>
         <p:grpSpPr>
           <a:xfrm>
-            <a:off x="3188524" y="6641985"/>
+            <a:off x="3266904" y="6641985"/>
             <a:ext cx="4003984" cy="847111"/>
             <a:chOff x="0" y="0"/>
             <a:chExt cx="1468587" cy="310705"/>
@@ -6370,13 +6700,31 @@
               </a:spcBef>
             </a:pPr>
             <a:r>
+              <a:rPr lang="en-US" sz="4432" spc="434" dirty="0">
+                <a:solidFill>
+                  <a:srgbClr val="231F20"/>
+                </a:solidFill>
+                <a:latin typeface="Oswald Bold"/>
+              </a:rPr>
+              <a:t>О</a:t>
+            </a:r>
+            <a:r>
+              <a:rPr lang="uk-UA" sz="4432" spc="434" dirty="0">
+                <a:solidFill>
+                  <a:srgbClr val="231F20"/>
+                </a:solidFill>
+                <a:latin typeface="Oswald Bold"/>
+              </a:rPr>
+              <a:t>с</a:t>
+            </a:r>
+            <a:r>
               <a:rPr lang="en-US" sz="4432" spc="434" dirty="0" err="1">
                 <a:solidFill>
                   <a:srgbClr val="231F20"/>
                 </a:solidFill>
                 <a:latin typeface="Oswald Bold"/>
               </a:rPr>
-              <a:t>ОСновні</a:t>
+              <a:t>новні</a:t>
             </a:r>
             <a:r>
               <a:rPr lang="en-US" sz="4432" spc="434" dirty="0">
@@ -6526,7 +6874,7 @@
         </p:nvSpPr>
         <p:spPr>
           <a:xfrm>
-            <a:off x="3445711" y="4377856"/>
+            <a:off x="3549627" y="4025974"/>
             <a:ext cx="3547784" cy="2130840"/>
           </a:xfrm>
           <a:prstGeom prst="rect">

</xml_diff>